<commit_message>
build based on 826fa30
</commit_message>
<xml_diff>
--- a/dev/assets/images/CVChannel_figures.pptx
+++ b/dev/assets/images/CVChannel_figures.pptx
@@ -6,7 +6,7 @@
   </p:sldMasterIdLst>
   <p:sldIdLst>
     <p:sldId id="256" r:id="rId2"/>
-    <p:sldId id="257" r:id="rId3"/>
+    <p:sldId id="258" r:id="rId3"/>
   </p:sldIdLst>
   <p:sldSz cx="12192000" cy="6858000"/>
   <p:notesSz cx="6858000" cy="9144000"/>
@@ -105,6 +105,11 @@
       </a:defRPr>
     </a:lvl9pPr>
   </p:defaultTextStyle>
+  <p:extLst>
+    <p:ext uri="{EFAFB233-063F-42B5-8137-9DF3F51BA10A}">
+      <p15:sldGuideLst xmlns:p15="http://schemas.microsoft.com/office/powerpoint/2012/main"/>
+    </p:ext>
+  </p:extLst>
 </p:presentation>
 </file>
 
@@ -255,7 +260,7 @@
           <a:p>
             <a:fld id="{CF006DFA-D6A8-4349-BE8B-0FEB2DCA267F}" type="datetimeFigureOut">
               <a:rPr lang="en-US" smtClean="0"/>
-              <a:t>9/20/21</a:t>
+              <a:t>10/14/21</a:t>
             </a:fld>
             <a:endParaRPr lang="en-US"/>
           </a:p>
@@ -453,7 +458,7 @@
           <a:p>
             <a:fld id="{CF006DFA-D6A8-4349-BE8B-0FEB2DCA267F}" type="datetimeFigureOut">
               <a:rPr lang="en-US" smtClean="0"/>
-              <a:t>9/20/21</a:t>
+              <a:t>10/14/21</a:t>
             </a:fld>
             <a:endParaRPr lang="en-US"/>
           </a:p>
@@ -661,7 +666,7 @@
           <a:p>
             <a:fld id="{CF006DFA-D6A8-4349-BE8B-0FEB2DCA267F}" type="datetimeFigureOut">
               <a:rPr lang="en-US" smtClean="0"/>
-              <a:t>9/20/21</a:t>
+              <a:t>10/14/21</a:t>
             </a:fld>
             <a:endParaRPr lang="en-US"/>
           </a:p>
@@ -859,7 +864,7 @@
           <a:p>
             <a:fld id="{CF006DFA-D6A8-4349-BE8B-0FEB2DCA267F}" type="datetimeFigureOut">
               <a:rPr lang="en-US" smtClean="0"/>
-              <a:t>9/20/21</a:t>
+              <a:t>10/14/21</a:t>
             </a:fld>
             <a:endParaRPr lang="en-US"/>
           </a:p>
@@ -1134,7 +1139,7 @@
           <a:p>
             <a:fld id="{CF006DFA-D6A8-4349-BE8B-0FEB2DCA267F}" type="datetimeFigureOut">
               <a:rPr lang="en-US" smtClean="0"/>
-              <a:t>9/20/21</a:t>
+              <a:t>10/14/21</a:t>
             </a:fld>
             <a:endParaRPr lang="en-US"/>
           </a:p>
@@ -1399,7 +1404,7 @@
           <a:p>
             <a:fld id="{CF006DFA-D6A8-4349-BE8B-0FEB2DCA267F}" type="datetimeFigureOut">
               <a:rPr lang="en-US" smtClean="0"/>
-              <a:t>9/20/21</a:t>
+              <a:t>10/14/21</a:t>
             </a:fld>
             <a:endParaRPr lang="en-US"/>
           </a:p>
@@ -1811,7 +1816,7 @@
           <a:p>
             <a:fld id="{CF006DFA-D6A8-4349-BE8B-0FEB2DCA267F}" type="datetimeFigureOut">
               <a:rPr lang="en-US" smtClean="0"/>
-              <a:t>9/20/21</a:t>
+              <a:t>10/14/21</a:t>
             </a:fld>
             <a:endParaRPr lang="en-US"/>
           </a:p>
@@ -1952,7 +1957,7 @@
           <a:p>
             <a:fld id="{CF006DFA-D6A8-4349-BE8B-0FEB2DCA267F}" type="datetimeFigureOut">
               <a:rPr lang="en-US" smtClean="0"/>
-              <a:t>9/20/21</a:t>
+              <a:t>10/14/21</a:t>
             </a:fld>
             <a:endParaRPr lang="en-US"/>
           </a:p>
@@ -2065,7 +2070,7 @@
           <a:p>
             <a:fld id="{CF006DFA-D6A8-4349-BE8B-0FEB2DCA267F}" type="datetimeFigureOut">
               <a:rPr lang="en-US" smtClean="0"/>
-              <a:t>9/20/21</a:t>
+              <a:t>10/14/21</a:t>
             </a:fld>
             <a:endParaRPr lang="en-US"/>
           </a:p>
@@ -2376,7 +2381,7 @@
           <a:p>
             <a:fld id="{CF006DFA-D6A8-4349-BE8B-0FEB2DCA267F}" type="datetimeFigureOut">
               <a:rPr lang="en-US" smtClean="0"/>
-              <a:t>9/20/21</a:t>
+              <a:t>10/14/21</a:t>
             </a:fld>
             <a:endParaRPr lang="en-US"/>
           </a:p>
@@ -2664,7 +2669,7 @@
           <a:p>
             <a:fld id="{CF006DFA-D6A8-4349-BE8B-0FEB2DCA267F}" type="datetimeFigureOut">
               <a:rPr lang="en-US" smtClean="0"/>
-              <a:t>9/20/21</a:t>
+              <a:t>10/14/21</a:t>
             </a:fld>
             <a:endParaRPr lang="en-US"/>
           </a:p>
@@ -2905,7 +2910,7 @@
           <a:p>
             <a:fld id="{CF006DFA-D6A8-4349-BE8B-0FEB2DCA267F}" type="datetimeFigureOut">
               <a:rPr lang="en-US" smtClean="0"/>
-              <a:t>9/20/21</a:t>
+              <a:t>10/14/21</a:t>
             </a:fld>
             <a:endParaRPr lang="en-US"/>
           </a:p>
@@ -3409,8 +3414,164 @@
           <a:chExt cx="0" cy="0"/>
         </a:xfrm>
       </p:grpSpPr>
-      <mc:AlternateContent xmlns:mc="http://schemas.openxmlformats.org/markup-compatibility/2006">
-        <mc:Choice xmlns:a14="http://schemas.microsoft.com/office/drawing/2010/main" Requires="a14">
+      <p:sp>
+        <p:nvSpPr>
+          <p:cNvPr id="37" name="Rectangle 36">
+            <a:extLst>
+              <a:ext uri="{FF2B5EF4-FFF2-40B4-BE49-F238E27FC236}">
+                <a16:creationId xmlns:a16="http://schemas.microsoft.com/office/drawing/2014/main" id="{644CE2DE-B8ED-7D49-BBE8-99453669B6F0}"/>
+              </a:ext>
+            </a:extLst>
+          </p:cNvPr>
+          <p:cNvSpPr/>
+          <p:nvPr/>
+        </p:nvSpPr>
+        <p:spPr>
+          <a:xfrm>
+            <a:off x="6030214" y="1875658"/>
+            <a:ext cx="4854010" cy="2706155"/>
+          </a:xfrm>
+          <a:prstGeom prst="rect">
+            <a:avLst/>
+          </a:prstGeom>
+          <a:solidFill>
+            <a:schemeClr val="bg1"/>
+          </a:solidFill>
+          <a:ln>
+            <a:noFill/>
+          </a:ln>
+        </p:spPr>
+        <p:style>
+          <a:lnRef idx="2">
+            <a:schemeClr val="accent1">
+              <a:shade val="50000"/>
+            </a:schemeClr>
+          </a:lnRef>
+          <a:fillRef idx="1">
+            <a:schemeClr val="accent1"/>
+          </a:fillRef>
+          <a:effectRef idx="0">
+            <a:schemeClr val="accent1"/>
+          </a:effectRef>
+          <a:fontRef idx="minor">
+            <a:schemeClr val="lt1"/>
+          </a:fontRef>
+        </p:style>
+        <p:txBody>
+          <a:bodyPr rtlCol="0" anchor="ctr"/>
+          <a:lstStyle/>
+          <a:p>
+            <a:pPr algn="ctr"/>
+            <a:endParaRPr lang="en-US"/>
+          </a:p>
+        </p:txBody>
+      </p:sp>
+      <p:sp>
+        <p:nvSpPr>
+          <p:cNvPr id="35" name="Rectangle 34">
+            <a:extLst>
+              <a:ext uri="{FF2B5EF4-FFF2-40B4-BE49-F238E27FC236}">
+                <a16:creationId xmlns:a16="http://schemas.microsoft.com/office/drawing/2014/main" id="{8B568B34-785B-8444-A6C0-98E8363140F3}"/>
+              </a:ext>
+            </a:extLst>
+          </p:cNvPr>
+          <p:cNvSpPr/>
+          <p:nvPr/>
+        </p:nvSpPr>
+        <p:spPr>
+          <a:xfrm>
+            <a:off x="122859" y="3538930"/>
+            <a:ext cx="4854010" cy="1586179"/>
+          </a:xfrm>
+          <a:prstGeom prst="rect">
+            <a:avLst/>
+          </a:prstGeom>
+          <a:solidFill>
+            <a:schemeClr val="bg1"/>
+          </a:solidFill>
+          <a:ln>
+            <a:noFill/>
+          </a:ln>
+        </p:spPr>
+        <p:style>
+          <a:lnRef idx="2">
+            <a:schemeClr val="accent1">
+              <a:shade val="50000"/>
+            </a:schemeClr>
+          </a:lnRef>
+          <a:fillRef idx="1">
+            <a:schemeClr val="accent1"/>
+          </a:fillRef>
+          <a:effectRef idx="0">
+            <a:schemeClr val="accent1"/>
+          </a:effectRef>
+          <a:fontRef idx="minor">
+            <a:schemeClr val="lt1"/>
+          </a:fontRef>
+        </p:style>
+        <p:txBody>
+          <a:bodyPr rtlCol="0" anchor="ctr"/>
+          <a:lstStyle/>
+          <a:p>
+            <a:pPr algn="ctr"/>
+            <a:endParaRPr lang="en-US"/>
+          </a:p>
+        </p:txBody>
+      </p:sp>
+      <p:sp>
+        <p:nvSpPr>
+          <p:cNvPr id="2" name="Rectangle 1">
+            <a:extLst>
+              <a:ext uri="{FF2B5EF4-FFF2-40B4-BE49-F238E27FC236}">
+                <a16:creationId xmlns:a16="http://schemas.microsoft.com/office/drawing/2014/main" id="{0557A288-335B-5C4C-A03B-16C0E96451A3}"/>
+              </a:ext>
+            </a:extLst>
+          </p:cNvPr>
+          <p:cNvSpPr/>
+          <p:nvPr/>
+        </p:nvSpPr>
+        <p:spPr>
+          <a:xfrm>
+            <a:off x="374821" y="1232721"/>
+            <a:ext cx="4854010" cy="1586179"/>
+          </a:xfrm>
+          <a:prstGeom prst="rect">
+            <a:avLst/>
+          </a:prstGeom>
+          <a:solidFill>
+            <a:schemeClr val="bg1"/>
+          </a:solidFill>
+          <a:ln>
+            <a:noFill/>
+          </a:ln>
+        </p:spPr>
+        <p:style>
+          <a:lnRef idx="2">
+            <a:schemeClr val="accent1">
+              <a:shade val="50000"/>
+            </a:schemeClr>
+          </a:lnRef>
+          <a:fillRef idx="1">
+            <a:schemeClr val="accent1"/>
+          </a:fillRef>
+          <a:effectRef idx="0">
+            <a:schemeClr val="accent1"/>
+          </a:effectRef>
+          <a:fontRef idx="minor">
+            <a:schemeClr val="lt1"/>
+          </a:fontRef>
+        </p:style>
+        <p:txBody>
+          <a:bodyPr rtlCol="0" anchor="ctr"/>
+          <a:lstStyle/>
+          <a:p>
+            <a:pPr algn="ctr"/>
+            <a:endParaRPr lang="en-US"/>
+          </a:p>
+        </p:txBody>
+      </p:sp>
+      <mc:AlternateContent xmlns:mc="http://schemas.openxmlformats.org/markup-compatibility/2006" xmlns:a14="http://schemas.microsoft.com/office/drawing/2010/main">
+        <mc:Choice Requires="a14">
           <p:sp>
             <p:nvSpPr>
               <p:cNvPr id="4" name="Rounded Rectangle 3">
@@ -3515,7 +3676,7 @@
             </p:txBody>
           </p:sp>
         </mc:Choice>
-        <mc:Fallback>
+        <mc:Fallback xmlns="">
           <p:sp>
             <p:nvSpPr>
               <p:cNvPr id="4" name="Rounded Rectangle 3">
@@ -3608,8 +3769,8 @@
           </a:fontRef>
         </p:style>
       </p:cxnSp>
-      <mc:AlternateContent xmlns:mc="http://schemas.openxmlformats.org/markup-compatibility/2006">
-        <mc:Choice xmlns:a14="http://schemas.microsoft.com/office/drawing/2010/main" Requires="a14">
+      <mc:AlternateContent xmlns:mc="http://schemas.openxmlformats.org/markup-compatibility/2006" xmlns:a14="http://schemas.microsoft.com/office/drawing/2010/main">
+        <mc:Choice Requires="a14">
           <p:sp>
             <p:nvSpPr>
               <p:cNvPr id="6" name="Rounded Rectangle 5">
@@ -3717,7 +3878,7 @@
             </p:txBody>
           </p:sp>
         </mc:Choice>
-        <mc:Fallback>
+        <mc:Fallback xmlns="">
           <p:sp>
             <p:nvSpPr>
               <p:cNvPr id="6" name="Rounded Rectangle 5">
@@ -3852,8 +4013,8 @@
           </a:fontRef>
         </p:style>
       </p:cxnSp>
-      <mc:AlternateContent xmlns:mc="http://schemas.openxmlformats.org/markup-compatibility/2006">
-        <mc:Choice xmlns:a14="http://schemas.microsoft.com/office/drawing/2010/main" Requires="a14">
+      <mc:AlternateContent xmlns:mc="http://schemas.openxmlformats.org/markup-compatibility/2006" xmlns:a14="http://schemas.microsoft.com/office/drawing/2010/main">
+        <mc:Choice Requires="a14">
           <p:sp>
             <p:nvSpPr>
               <p:cNvPr id="9" name="TextBox 8">
@@ -3903,7 +4064,7 @@
             </p:txBody>
           </p:sp>
         </mc:Choice>
-        <mc:Fallback>
+        <mc:Fallback xmlns="">
           <p:sp>
             <p:nvSpPr>
               <p:cNvPr id="9" name="TextBox 8">
@@ -3948,8 +4109,8 @@
           </p:sp>
         </mc:Fallback>
       </mc:AlternateContent>
-      <mc:AlternateContent xmlns:mc="http://schemas.openxmlformats.org/markup-compatibility/2006">
-        <mc:Choice xmlns:a14="http://schemas.microsoft.com/office/drawing/2010/main" Requires="a14">
+      <mc:AlternateContent xmlns:mc="http://schemas.openxmlformats.org/markup-compatibility/2006" xmlns:a14="http://schemas.microsoft.com/office/drawing/2010/main">
+        <mc:Choice Requires="a14">
           <p:sp>
             <p:nvSpPr>
               <p:cNvPr id="10" name="TextBox 9">
@@ -3999,7 +4160,7 @@
             </p:txBody>
           </p:sp>
         </mc:Choice>
-        <mc:Fallback>
+        <mc:Fallback xmlns="">
           <p:sp>
             <p:nvSpPr>
               <p:cNvPr id="10" name="TextBox 9">
@@ -4044,8 +4205,8 @@
           </p:sp>
         </mc:Fallback>
       </mc:AlternateContent>
-      <mc:AlternateContent xmlns:mc="http://schemas.openxmlformats.org/markup-compatibility/2006">
-        <mc:Choice xmlns:a14="http://schemas.microsoft.com/office/drawing/2010/main" Requires="a14">
+      <mc:AlternateContent xmlns:mc="http://schemas.openxmlformats.org/markup-compatibility/2006" xmlns:a14="http://schemas.microsoft.com/office/drawing/2010/main">
+        <mc:Choice Requires="a14">
           <p:sp>
             <p:nvSpPr>
               <p:cNvPr id="11" name="Rounded Rectangle 10">
@@ -4126,7 +4287,7 @@
             </p:txBody>
           </p:sp>
         </mc:Choice>
-        <mc:Fallback>
+        <mc:Fallback xmlns="">
           <p:sp>
             <p:nvSpPr>
               <p:cNvPr id="11" name="Rounded Rectangle 10">
@@ -4235,7 +4396,7 @@
             </p:nvSpPr>
             <p:spPr>
               <a:xfrm>
-                <a:off x="1925236" y="2472153"/>
+                <a:off x="2216962" y="1765142"/>
                 <a:ext cx="1173294" cy="590365"/>
               </a:xfrm>
               <a:prstGeom prst="roundRect">
@@ -4362,7 +4523,7 @@
             </p:nvSpPr>
             <p:spPr>
               <a:xfrm>
-                <a:off x="1925236" y="2472153"/>
+                <a:off x="2216962" y="1765142"/>
                 <a:ext cx="1173294" cy="590365"/>
               </a:xfrm>
               <a:prstGeom prst="roundRect">
@@ -4412,7 +4573,7 @@
         </p:nvCxnSpPr>
         <p:spPr>
           <a:xfrm>
-            <a:off x="1508518" y="2767336"/>
+            <a:off x="1800244" y="2060325"/>
             <a:ext cx="416718" cy="0"/>
           </a:xfrm>
           <a:prstGeom prst="straightConnector1">
@@ -4453,7 +4614,7 @@
         </p:nvCxnSpPr>
         <p:spPr>
           <a:xfrm flipV="1">
-            <a:off x="3098530" y="2767332"/>
+            <a:off x="3390256" y="2060321"/>
             <a:ext cx="553782" cy="3"/>
           </a:xfrm>
           <a:prstGeom prst="straightConnector1">
@@ -4494,7 +4655,7 @@
             </p:nvSpPr>
             <p:spPr>
               <a:xfrm>
-                <a:off x="1174957" y="2582669"/>
+                <a:off x="1466683" y="1875658"/>
                 <a:ext cx="45719" cy="369332"/>
               </a:xfrm>
               <a:prstGeom prst="rect">
@@ -4546,7 +4707,7 @@
             </p:nvSpPr>
             <p:spPr>
               <a:xfrm>
-                <a:off x="1174957" y="2582669"/>
+                <a:off x="1466683" y="1875658"/>
                 <a:ext cx="45719" cy="369332"/>
               </a:xfrm>
               <a:prstGeom prst="rect">
@@ -4555,7 +4716,7 @@
               <a:blipFill>
                 <a:blip r:embed="rId8"/>
                 <a:stretch>
-                  <a:fillRect l="-75000" r="-325000"/>
+                  <a:fillRect l="-60000" r="-240000"/>
                 </a:stretch>
               </a:blipFill>
             </p:spPr>
@@ -4590,7 +4751,7 @@
             </p:nvSpPr>
             <p:spPr>
               <a:xfrm>
-                <a:off x="3635085" y="2583749"/>
+                <a:off x="3926811" y="1876738"/>
                 <a:ext cx="371384" cy="369332"/>
               </a:xfrm>
               <a:prstGeom prst="rect">
@@ -4642,7 +4803,7 @@
             </p:nvSpPr>
             <p:spPr>
               <a:xfrm>
-                <a:off x="3635085" y="2583749"/>
+                <a:off x="3926811" y="1876738"/>
                 <a:ext cx="371384" cy="369332"/>
               </a:xfrm>
               <a:prstGeom prst="rect">
@@ -4651,7 +4812,7 @@
               <a:blipFill>
                 <a:blip r:embed="rId9"/>
                 <a:stretch>
-                  <a:fillRect b="-6667"/>
+                  <a:fillRect b="-10000"/>
                 </a:stretch>
               </a:blipFill>
             </p:spPr>
@@ -4686,7 +4847,7 @@
             </p:nvSpPr>
             <p:spPr>
               <a:xfrm>
-                <a:off x="6253423" y="2668119"/>
+                <a:off x="7054806" y="2668119"/>
                 <a:ext cx="637528" cy="1586191"/>
               </a:xfrm>
               <a:prstGeom prst="roundRect">
@@ -4793,7 +4954,7 @@
             </p:nvSpPr>
             <p:spPr>
               <a:xfrm>
-                <a:off x="6253423" y="2668119"/>
+                <a:off x="7054806" y="2668119"/>
                 <a:ext cx="637528" cy="1586191"/>
               </a:xfrm>
               <a:prstGeom prst="roundRect">
@@ -4843,7 +5004,7 @@
         </p:nvCxnSpPr>
         <p:spPr>
           <a:xfrm>
-            <a:off x="6890951" y="3959127"/>
+            <a:off x="7692334" y="3959127"/>
             <a:ext cx="419996" cy="3"/>
           </a:xfrm>
           <a:prstGeom prst="straightConnector1">
@@ -4884,7 +5045,7 @@
             </p:nvSpPr>
             <p:spPr>
               <a:xfrm>
-                <a:off x="8368472" y="2668119"/>
+                <a:off x="9169855" y="2668119"/>
                 <a:ext cx="637528" cy="1586193"/>
               </a:xfrm>
               <a:prstGeom prst="roundRect">
@@ -4994,7 +5155,7 @@
             </p:nvSpPr>
             <p:spPr>
               <a:xfrm>
-                <a:off x="8368472" y="2668119"/>
+                <a:off x="9169855" y="2668119"/>
                 <a:ext cx="637528" cy="1586193"/>
               </a:xfrm>
               <a:prstGeom prst="roundRect">
@@ -5045,7 +5206,7 @@
         </p:nvCxnSpPr>
         <p:spPr>
           <a:xfrm>
-            <a:off x="5820427" y="3461214"/>
+            <a:off x="6621810" y="3461214"/>
             <a:ext cx="432996" cy="1"/>
           </a:xfrm>
           <a:prstGeom prst="straightConnector1">
@@ -5088,7 +5249,7 @@
         </p:nvCxnSpPr>
         <p:spPr>
           <a:xfrm flipV="1">
-            <a:off x="9006000" y="3461214"/>
+            <a:off x="9807383" y="3461214"/>
             <a:ext cx="437907" cy="2"/>
           </a:xfrm>
           <a:prstGeom prst="straightConnector1">
@@ -5129,7 +5290,7 @@
             </p:nvSpPr>
             <p:spPr>
               <a:xfrm>
-                <a:off x="5519421" y="3276548"/>
+                <a:off x="6320804" y="3276548"/>
                 <a:ext cx="301006" cy="369332"/>
               </a:xfrm>
               <a:prstGeom prst="rect">
@@ -5181,7 +5342,7 @@
             </p:nvSpPr>
             <p:spPr>
               <a:xfrm>
-                <a:off x="5519421" y="3276548"/>
+                <a:off x="6320804" y="3276548"/>
                 <a:ext cx="301006" cy="369332"/>
               </a:xfrm>
               <a:prstGeom prst="rect">
@@ -5225,7 +5386,7 @@
             </p:nvSpPr>
             <p:spPr>
               <a:xfrm>
-                <a:off x="9443907" y="3276548"/>
+                <a:off x="10245290" y="3276548"/>
                 <a:ext cx="371384" cy="369332"/>
               </a:xfrm>
               <a:prstGeom prst="rect">
@@ -5277,7 +5438,7 @@
             </p:nvSpPr>
             <p:spPr>
               <a:xfrm>
-                <a:off x="9443907" y="3276548"/>
+                <a:off x="10245290" y="3276548"/>
                 <a:ext cx="371384" cy="369332"/>
               </a:xfrm>
               <a:prstGeom prst="rect">
@@ -5321,7 +5482,7 @@
             </p:nvSpPr>
             <p:spPr>
               <a:xfrm>
-                <a:off x="7310947" y="3663947"/>
+                <a:off x="8112330" y="3663947"/>
                 <a:ext cx="637528" cy="590365"/>
               </a:xfrm>
               <a:prstGeom prst="roundRect">
@@ -5404,7 +5565,7 @@
             </p:nvSpPr>
             <p:spPr>
               <a:xfrm>
-                <a:off x="7310947" y="3663947"/>
+                <a:off x="8112330" y="3663947"/>
                 <a:ext cx="637528" cy="590365"/>
               </a:xfrm>
               <a:prstGeom prst="roundRect">
@@ -5454,7 +5615,7 @@
         </p:nvCxnSpPr>
         <p:spPr>
           <a:xfrm>
-            <a:off x="7948475" y="3959130"/>
+            <a:off x="8749858" y="3959130"/>
             <a:ext cx="419997" cy="0"/>
           </a:xfrm>
           <a:prstGeom prst="straightConnector1">
@@ -5496,7 +5657,7 @@
         </p:nvCxnSpPr>
         <p:spPr>
           <a:xfrm>
-            <a:off x="6890951" y="2963300"/>
+            <a:off x="7692334" y="2963300"/>
             <a:ext cx="419996" cy="2"/>
           </a:xfrm>
           <a:prstGeom prst="straightConnector1">
@@ -5537,7 +5698,7 @@
             </p:nvSpPr>
             <p:spPr>
               <a:xfrm>
-                <a:off x="7310947" y="2668119"/>
+                <a:off x="8112330" y="2668119"/>
                 <a:ext cx="637528" cy="590365"/>
               </a:xfrm>
               <a:prstGeom prst="roundRect">
@@ -5620,7 +5781,7 @@
             </p:nvSpPr>
             <p:spPr>
               <a:xfrm>
-                <a:off x="7310947" y="2668119"/>
+                <a:off x="8112330" y="2668119"/>
                 <a:ext cx="637528" cy="590365"/>
               </a:xfrm>
               <a:prstGeom prst="roundRect">
@@ -5670,7 +5831,7 @@
         </p:nvCxnSpPr>
         <p:spPr>
           <a:xfrm>
-            <a:off x="7948475" y="2963302"/>
+            <a:off x="8749858" y="2963302"/>
             <a:ext cx="419997" cy="0"/>
           </a:xfrm>
           <a:prstGeom prst="straightConnector1">
@@ -5709,7 +5870,7 @@
         </p:nvSpPr>
         <p:spPr>
           <a:xfrm>
-            <a:off x="209005" y="2011495"/>
+            <a:off x="500731" y="1263388"/>
             <a:ext cx="4548833" cy="369332"/>
           </a:xfrm>
           <a:prstGeom prst="rect">
@@ -5781,7 +5942,7 @@
         </p:nvSpPr>
         <p:spPr>
           <a:xfrm>
-            <a:off x="6282754" y="1969133"/>
+            <a:off x="7084137" y="1969133"/>
             <a:ext cx="2723246" cy="369332"/>
           </a:xfrm>
           <a:prstGeom prst="rect">
@@ -5837,7 +5998,7 @@
     </p:spTree>
     <p:extLst>
       <p:ext uri="{BB962C8B-B14F-4D97-AF65-F5344CB8AC3E}">
-        <p14:creationId xmlns:p14="http://schemas.microsoft.com/office/powerpoint/2010/main" val="1852791679"/>
+        <p14:creationId xmlns:p14="http://schemas.microsoft.com/office/powerpoint/2010/main" val="1081629054"/>
       </p:ext>
     </p:extLst>
   </p:cSld>

</xml_diff>